<commit_message>
Corrected figure on trp regulation: trpS is a synthetase and not a tRNA.
</commit_message>
<xml_diff>
--- a/imsvBacteriaSimulatorSpecification/figure/trpGene.pptx
+++ b/imsvBacteriaSimulatorSpecification/figure/trpGene.pptx
@@ -243,7 +243,7 @@
           <a:p>
             <a:fld id="{A8DE144C-00AC-4908-8818-1BC240117CBE}" type="datetimeFigureOut">
               <a:rPr lang="fr-FR" smtClean="0"/>
-              <a:t>21/10/2015</a:t>
+              <a:t>27/10/2015</a:t>
             </a:fld>
             <a:endParaRPr lang="fr-FR"/>
           </a:p>
@@ -413,7 +413,7 @@
           <a:p>
             <a:fld id="{A8DE144C-00AC-4908-8818-1BC240117CBE}" type="datetimeFigureOut">
               <a:rPr lang="fr-FR" smtClean="0"/>
-              <a:t>21/10/2015</a:t>
+              <a:t>27/10/2015</a:t>
             </a:fld>
             <a:endParaRPr lang="fr-FR"/>
           </a:p>
@@ -593,7 +593,7 @@
           <a:p>
             <a:fld id="{A8DE144C-00AC-4908-8818-1BC240117CBE}" type="datetimeFigureOut">
               <a:rPr lang="fr-FR" smtClean="0"/>
-              <a:t>21/10/2015</a:t>
+              <a:t>27/10/2015</a:t>
             </a:fld>
             <a:endParaRPr lang="fr-FR"/>
           </a:p>
@@ -763,7 +763,7 @@
           <a:p>
             <a:fld id="{A8DE144C-00AC-4908-8818-1BC240117CBE}" type="datetimeFigureOut">
               <a:rPr lang="fr-FR" smtClean="0"/>
-              <a:t>21/10/2015</a:t>
+              <a:t>27/10/2015</a:t>
             </a:fld>
             <a:endParaRPr lang="fr-FR"/>
           </a:p>
@@ -1009,7 +1009,7 @@
           <a:p>
             <a:fld id="{A8DE144C-00AC-4908-8818-1BC240117CBE}" type="datetimeFigureOut">
               <a:rPr lang="fr-FR" smtClean="0"/>
-              <a:t>21/10/2015</a:t>
+              <a:t>27/10/2015</a:t>
             </a:fld>
             <a:endParaRPr lang="fr-FR"/>
           </a:p>
@@ -1241,7 +1241,7 @@
           <a:p>
             <a:fld id="{A8DE144C-00AC-4908-8818-1BC240117CBE}" type="datetimeFigureOut">
               <a:rPr lang="fr-FR" smtClean="0"/>
-              <a:t>21/10/2015</a:t>
+              <a:t>27/10/2015</a:t>
             </a:fld>
             <a:endParaRPr lang="fr-FR"/>
           </a:p>
@@ -1608,7 +1608,7 @@
           <a:p>
             <a:fld id="{A8DE144C-00AC-4908-8818-1BC240117CBE}" type="datetimeFigureOut">
               <a:rPr lang="fr-FR" smtClean="0"/>
-              <a:t>21/10/2015</a:t>
+              <a:t>27/10/2015</a:t>
             </a:fld>
             <a:endParaRPr lang="fr-FR"/>
           </a:p>
@@ -1726,7 +1726,7 @@
           <a:p>
             <a:fld id="{A8DE144C-00AC-4908-8818-1BC240117CBE}" type="datetimeFigureOut">
               <a:rPr lang="fr-FR" smtClean="0"/>
-              <a:t>21/10/2015</a:t>
+              <a:t>27/10/2015</a:t>
             </a:fld>
             <a:endParaRPr lang="fr-FR"/>
           </a:p>
@@ -1821,7 +1821,7 @@
           <a:p>
             <a:fld id="{A8DE144C-00AC-4908-8818-1BC240117CBE}" type="datetimeFigureOut">
               <a:rPr lang="fr-FR" smtClean="0"/>
-              <a:t>21/10/2015</a:t>
+              <a:t>27/10/2015</a:t>
             </a:fld>
             <a:endParaRPr lang="fr-FR"/>
           </a:p>
@@ -2098,7 +2098,7 @@
           <a:p>
             <a:fld id="{A8DE144C-00AC-4908-8818-1BC240117CBE}" type="datetimeFigureOut">
               <a:rPr lang="fr-FR" smtClean="0"/>
-              <a:t>21/10/2015</a:t>
+              <a:t>27/10/2015</a:t>
             </a:fld>
             <a:endParaRPr lang="fr-FR"/>
           </a:p>
@@ -2351,7 +2351,7 @@
           <a:p>
             <a:fld id="{A8DE144C-00AC-4908-8818-1BC240117CBE}" type="datetimeFigureOut">
               <a:rPr lang="fr-FR" smtClean="0"/>
-              <a:t>21/10/2015</a:t>
+              <a:t>27/10/2015</a:t>
             </a:fld>
             <a:endParaRPr lang="fr-FR"/>
           </a:p>
@@ -2564,7 +2564,7 @@
           <a:p>
             <a:fld id="{A8DE144C-00AC-4908-8818-1BC240117CBE}" type="datetimeFigureOut">
               <a:rPr lang="fr-FR" smtClean="0"/>
-              <a:t>21/10/2015</a:t>
+              <a:t>27/10/2015</a:t>
             </a:fld>
             <a:endParaRPr lang="fr-FR"/>
           </a:p>
@@ -5520,7 +5520,7 @@
         </p:nvGrpSpPr>
         <p:grpSpPr>
           <a:xfrm>
-            <a:off x="640763" y="2766374"/>
+            <a:off x="3665629" y="2844223"/>
             <a:ext cx="1592097" cy="904820"/>
             <a:chOff x="7637034" y="2314116"/>
             <a:chExt cx="1592097" cy="904820"/>
@@ -5760,14 +5760,17 @@
       </p:grpSp>
       <p:cxnSp>
         <p:nvCxnSpPr>
-          <p:cNvPr id="197" name="Connecteur droit avec flèche 196"/>
-          <p:cNvCxnSpPr/>
+          <p:cNvPr id="200" name="Connecteur droit avec flèche 199"/>
+          <p:cNvCxnSpPr>
+            <a:stCxn id="198" idx="3"/>
+            <a:endCxn id="201" idx="1"/>
+          </p:cNvCxnSpPr>
           <p:nvPr/>
         </p:nvCxnSpPr>
         <p:spPr>
-          <a:xfrm>
-            <a:off x="2012908" y="3245024"/>
-            <a:ext cx="983599" cy="0"/>
+          <a:xfrm flipV="1">
+            <a:off x="2856047" y="3212612"/>
+            <a:ext cx="2419418" cy="18614"/>
           </a:xfrm>
           <a:prstGeom prst="straightConnector1">
             <a:avLst/>
@@ -5799,7 +5802,7 @@
         </p:nvSpPr>
         <p:spPr>
           <a:xfrm>
-            <a:off x="2945703" y="3046560"/>
+            <a:off x="2153223" y="3046560"/>
             <a:ext cx="702824" cy="369332"/>
           </a:xfrm>
           <a:prstGeom prst="rect">
@@ -5821,41 +5824,6 @@
           </a:p>
         </p:txBody>
       </p:sp>
-      <p:cxnSp>
-        <p:nvCxnSpPr>
-          <p:cNvPr id="200" name="Connecteur droit avec flèche 199"/>
-          <p:cNvCxnSpPr>
-            <a:stCxn id="198" idx="3"/>
-          </p:cNvCxnSpPr>
-          <p:nvPr/>
-        </p:nvCxnSpPr>
-        <p:spPr>
-          <a:xfrm>
-            <a:off x="3648527" y="3231226"/>
-            <a:ext cx="1323391" cy="0"/>
-          </a:xfrm>
-          <a:prstGeom prst="straightConnector1">
-            <a:avLst/>
-          </a:prstGeom>
-          <a:ln>
-            <a:tailEnd type="triangle"/>
-          </a:ln>
-        </p:spPr>
-        <p:style>
-          <a:lnRef idx="1">
-            <a:schemeClr val="dk1"/>
-          </a:lnRef>
-          <a:fillRef idx="0">
-            <a:schemeClr val="dk1"/>
-          </a:fillRef>
-          <a:effectRef idx="0">
-            <a:schemeClr val="dk1"/>
-          </a:effectRef>
-          <a:fontRef idx="minor">
-            <a:schemeClr val="tx1"/>
-          </a:fontRef>
-        </p:style>
-      </p:cxnSp>
       <p:sp>
         <p:nvSpPr>
           <p:cNvPr id="201" name="ZoneTexte 200"/>
@@ -5864,7 +5832,7 @@
         </p:nvSpPr>
         <p:spPr>
           <a:xfrm>
-            <a:off x="5056009" y="3027946"/>
+            <a:off x="5275465" y="3027946"/>
             <a:ext cx="1497194" cy="369332"/>
           </a:xfrm>
           <a:prstGeom prst="rect">
@@ -6002,144 +5970,14 @@
       </p:sp>
       <p:sp>
         <p:nvSpPr>
-          <p:cNvPr id="205" name="Forme libre 204"/>
-          <p:cNvSpPr/>
-          <p:nvPr/>
-        </p:nvSpPr>
-        <p:spPr>
-          <a:xfrm>
-            <a:off x="999533" y="2840477"/>
-            <a:ext cx="2259233" cy="1110198"/>
-          </a:xfrm>
-          <a:custGeom>
-            <a:avLst/>
-            <a:gdLst>
-              <a:gd name="connsiteX0" fmla="*/ 2259233 w 2259233"/>
-              <a:gd name="connsiteY0" fmla="*/ 573932 h 1110198"/>
-              <a:gd name="connsiteX1" fmla="*/ 2074407 w 2259233"/>
-              <a:gd name="connsiteY1" fmla="*/ 729574 h 1110198"/>
-              <a:gd name="connsiteX2" fmla="*/ 1383744 w 2259233"/>
-              <a:gd name="connsiteY2" fmla="*/ 1050587 h 1110198"/>
-              <a:gd name="connsiteX3" fmla="*/ 751446 w 2259233"/>
-              <a:gd name="connsiteY3" fmla="*/ 1108953 h 1110198"/>
-              <a:gd name="connsiteX4" fmla="*/ 148331 w 2259233"/>
-              <a:gd name="connsiteY4" fmla="*/ 1031132 h 1110198"/>
-              <a:gd name="connsiteX5" fmla="*/ 12144 w 2259233"/>
-              <a:gd name="connsiteY5" fmla="*/ 836578 h 1110198"/>
-              <a:gd name="connsiteX6" fmla="*/ 70510 w 2259233"/>
-              <a:gd name="connsiteY6" fmla="*/ 642025 h 1110198"/>
-              <a:gd name="connsiteX7" fmla="*/ 576348 w 2259233"/>
-              <a:gd name="connsiteY7" fmla="*/ 0 h 1110198"/>
-            </a:gdLst>
-            <a:ahLst/>
-            <a:cxnLst>
-              <a:cxn ang="0">
-                <a:pos x="connsiteX0" y="connsiteY0"/>
-              </a:cxn>
-              <a:cxn ang="0">
-                <a:pos x="connsiteX1" y="connsiteY1"/>
-              </a:cxn>
-              <a:cxn ang="0">
-                <a:pos x="connsiteX2" y="connsiteY2"/>
-              </a:cxn>
-              <a:cxn ang="0">
-                <a:pos x="connsiteX3" y="connsiteY3"/>
-              </a:cxn>
-              <a:cxn ang="0">
-                <a:pos x="connsiteX4" y="connsiteY4"/>
-              </a:cxn>
-              <a:cxn ang="0">
-                <a:pos x="connsiteX5" y="connsiteY5"/>
-              </a:cxn>
-              <a:cxn ang="0">
-                <a:pos x="connsiteX6" y="connsiteY6"/>
-              </a:cxn>
-              <a:cxn ang="0">
-                <a:pos x="connsiteX7" y="connsiteY7"/>
-              </a:cxn>
-            </a:cxnLst>
-            <a:rect l="l" t="t" r="r" b="b"/>
-            <a:pathLst>
-              <a:path w="2259233" h="1110198">
-                <a:moveTo>
-                  <a:pt x="2259233" y="573932"/>
-                </a:moveTo>
-                <a:cubicBezTo>
-                  <a:pt x="2239777" y="612032"/>
-                  <a:pt x="2220322" y="650132"/>
-                  <a:pt x="2074407" y="729574"/>
-                </a:cubicBezTo>
-                <a:cubicBezTo>
-                  <a:pt x="1928492" y="809016"/>
-                  <a:pt x="1604237" y="987357"/>
-                  <a:pt x="1383744" y="1050587"/>
-                </a:cubicBezTo>
-                <a:cubicBezTo>
-                  <a:pt x="1163250" y="1113817"/>
-                  <a:pt x="957348" y="1112195"/>
-                  <a:pt x="751446" y="1108953"/>
-                </a:cubicBezTo>
-                <a:cubicBezTo>
-                  <a:pt x="545544" y="1105711"/>
-                  <a:pt x="271548" y="1076528"/>
-                  <a:pt x="148331" y="1031132"/>
-                </a:cubicBezTo>
-                <a:cubicBezTo>
-                  <a:pt x="25114" y="985736"/>
-                  <a:pt x="25114" y="901429"/>
-                  <a:pt x="12144" y="836578"/>
-                </a:cubicBezTo>
-                <a:cubicBezTo>
-                  <a:pt x="-826" y="771727"/>
-                  <a:pt x="-23524" y="781455"/>
-                  <a:pt x="70510" y="642025"/>
-                </a:cubicBezTo>
-                <a:cubicBezTo>
-                  <a:pt x="164544" y="502595"/>
-                  <a:pt x="370446" y="251297"/>
-                  <a:pt x="576348" y="0"/>
-                </a:cubicBezTo>
-              </a:path>
-            </a:pathLst>
-          </a:custGeom>
-          <a:ln>
-            <a:headEnd type="none" w="med" len="med"/>
-            <a:tailEnd type="arrow" w="med" len="med"/>
-          </a:ln>
-        </p:spPr>
-        <p:style>
-          <a:lnRef idx="1">
-            <a:schemeClr val="dk1"/>
-          </a:lnRef>
-          <a:fillRef idx="0">
-            <a:schemeClr val="dk1"/>
-          </a:fillRef>
-          <a:effectRef idx="0">
-            <a:schemeClr val="dk1"/>
-          </a:effectRef>
-          <a:fontRef idx="minor">
-            <a:schemeClr val="tx1"/>
-          </a:fontRef>
-        </p:style>
-        <p:txBody>
-          <a:bodyPr rtlCol="0" anchor="ctr"/>
-          <a:lstStyle/>
-          <a:p>
-            <a:pPr algn="ctr"/>
-            <a:endParaRPr lang="fr-FR"/>
-          </a:p>
-        </p:txBody>
-      </p:sp>
-      <p:sp>
-        <p:nvSpPr>
           <p:cNvPr id="206" name="Forme libre 205"/>
           <p:cNvSpPr/>
           <p:nvPr/>
         </p:nvSpPr>
         <p:spPr>
           <a:xfrm>
-            <a:off x="3249038" y="1867711"/>
-            <a:ext cx="6969431" cy="1953031"/>
+            <a:off x="2638996" y="1867711"/>
+            <a:ext cx="7579474" cy="2066989"/>
           </a:xfrm>
           <a:custGeom>
             <a:avLst/>
@@ -6867,96 +6705,6 @@
       </p:sp>
       <p:sp>
         <p:nvSpPr>
-          <p:cNvPr id="218" name="Forme libre 217"/>
-          <p:cNvSpPr/>
-          <p:nvPr/>
-        </p:nvSpPr>
-        <p:spPr>
-          <a:xfrm>
-            <a:off x="3618689" y="5233481"/>
-            <a:ext cx="1624520" cy="1284051"/>
-          </a:xfrm>
-          <a:custGeom>
-            <a:avLst/>
-            <a:gdLst>
-              <a:gd name="connsiteX0" fmla="*/ 0 w 1624520"/>
-              <a:gd name="connsiteY0" fmla="*/ 0 h 1284051"/>
-              <a:gd name="connsiteX1" fmla="*/ 807396 w 1624520"/>
-              <a:gd name="connsiteY1" fmla="*/ 223736 h 1284051"/>
-              <a:gd name="connsiteX2" fmla="*/ 1206230 w 1624520"/>
-              <a:gd name="connsiteY2" fmla="*/ 573932 h 1284051"/>
-              <a:gd name="connsiteX3" fmla="*/ 1624520 w 1624520"/>
-              <a:gd name="connsiteY3" fmla="*/ 1284051 h 1284051"/>
-            </a:gdLst>
-            <a:ahLst/>
-            <a:cxnLst>
-              <a:cxn ang="0">
-                <a:pos x="connsiteX0" y="connsiteY0"/>
-              </a:cxn>
-              <a:cxn ang="0">
-                <a:pos x="connsiteX1" y="connsiteY1"/>
-              </a:cxn>
-              <a:cxn ang="0">
-                <a:pos x="connsiteX2" y="connsiteY2"/>
-              </a:cxn>
-              <a:cxn ang="0">
-                <a:pos x="connsiteX3" y="connsiteY3"/>
-              </a:cxn>
-            </a:cxnLst>
-            <a:rect l="l" t="t" r="r" b="b"/>
-            <a:pathLst>
-              <a:path w="1624520" h="1284051">
-                <a:moveTo>
-                  <a:pt x="0" y="0"/>
-                </a:moveTo>
-                <a:cubicBezTo>
-                  <a:pt x="303179" y="64040"/>
-                  <a:pt x="606358" y="128081"/>
-                  <a:pt x="807396" y="223736"/>
-                </a:cubicBezTo>
-                <a:cubicBezTo>
-                  <a:pt x="1008434" y="319391"/>
-                  <a:pt x="1070043" y="397213"/>
-                  <a:pt x="1206230" y="573932"/>
-                </a:cubicBezTo>
-                <a:cubicBezTo>
-                  <a:pt x="1342417" y="750651"/>
-                  <a:pt x="1483468" y="1017351"/>
-                  <a:pt x="1624520" y="1284051"/>
-                </a:cubicBezTo>
-              </a:path>
-            </a:pathLst>
-          </a:custGeom>
-          <a:ln>
-            <a:headEnd type="none" w="med" len="med"/>
-            <a:tailEnd type="arrow" w="med" len="med"/>
-          </a:ln>
-        </p:spPr>
-        <p:style>
-          <a:lnRef idx="1">
-            <a:schemeClr val="dk1"/>
-          </a:lnRef>
-          <a:fillRef idx="0">
-            <a:schemeClr val="dk1"/>
-          </a:fillRef>
-          <a:effectRef idx="0">
-            <a:schemeClr val="dk1"/>
-          </a:effectRef>
-          <a:fontRef idx="minor">
-            <a:schemeClr val="tx1"/>
-          </a:fontRef>
-        </p:style>
-        <p:txBody>
-          <a:bodyPr rtlCol="0" anchor="ctr"/>
-          <a:lstStyle/>
-          <a:p>
-            <a:pPr algn="ctr"/>
-            <a:endParaRPr lang="fr-FR"/>
-          </a:p>
-        </p:txBody>
-      </p:sp>
-      <p:sp>
-        <p:nvSpPr>
           <p:cNvPr id="219" name="Forme libre 218"/>
           <p:cNvSpPr/>
           <p:nvPr/>
@@ -7013,6 +6761,106 @@
                   <a:pt x="450715" y="671209"/>
                   <a:pt x="522051" y="958174"/>
                   <a:pt x="593387" y="1245140"/>
+                </a:cubicBezTo>
+              </a:path>
+            </a:pathLst>
+          </a:custGeom>
+          <a:ln>
+            <a:headEnd type="none" w="med" len="med"/>
+            <a:tailEnd type="arrow" w="med" len="med"/>
+          </a:ln>
+        </p:spPr>
+        <p:style>
+          <a:lnRef idx="1">
+            <a:schemeClr val="dk1"/>
+          </a:lnRef>
+          <a:fillRef idx="0">
+            <a:schemeClr val="dk1"/>
+          </a:fillRef>
+          <a:effectRef idx="0">
+            <a:schemeClr val="dk1"/>
+          </a:effectRef>
+          <a:fontRef idx="minor">
+            <a:schemeClr val="tx1"/>
+          </a:fontRef>
+        </p:style>
+        <p:txBody>
+          <a:bodyPr rtlCol="0" anchor="ctr"/>
+          <a:lstStyle/>
+          <a:p>
+            <a:pPr algn="ctr"/>
+            <a:endParaRPr lang="fr-FR"/>
+          </a:p>
+        </p:txBody>
+      </p:sp>
+      <p:sp>
+        <p:nvSpPr>
+          <p:cNvPr id="3" name="Forme libre 2"/>
+          <p:cNvSpPr/>
+          <p:nvPr/>
+        </p:nvSpPr>
+        <p:spPr>
+          <a:xfrm>
+            <a:off x="3169920" y="2684011"/>
+            <a:ext cx="1603914" cy="1145301"/>
+          </a:xfrm>
+          <a:custGeom>
+            <a:avLst/>
+            <a:gdLst>
+              <a:gd name="connsiteX0" fmla="*/ 0 w 1109472"/>
+              <a:gd name="connsiteY0" fmla="*/ 950976 h 1000768"/>
+              <a:gd name="connsiteX1" fmla="*/ 134112 w 1109472"/>
+              <a:gd name="connsiteY1" fmla="*/ 987552 h 1000768"/>
+              <a:gd name="connsiteX2" fmla="*/ 499872 w 1109472"/>
+              <a:gd name="connsiteY2" fmla="*/ 987552 h 1000768"/>
+              <a:gd name="connsiteX3" fmla="*/ 719328 w 1109472"/>
+              <a:gd name="connsiteY3" fmla="*/ 829056 h 1000768"/>
+              <a:gd name="connsiteX4" fmla="*/ 1109472 w 1109472"/>
+              <a:gd name="connsiteY4" fmla="*/ 0 h 1000768"/>
+            </a:gdLst>
+            <a:ahLst/>
+            <a:cxnLst>
+              <a:cxn ang="0">
+                <a:pos x="connsiteX0" y="connsiteY0"/>
+              </a:cxn>
+              <a:cxn ang="0">
+                <a:pos x="connsiteX1" y="connsiteY1"/>
+              </a:cxn>
+              <a:cxn ang="0">
+                <a:pos x="connsiteX2" y="connsiteY2"/>
+              </a:cxn>
+              <a:cxn ang="0">
+                <a:pos x="connsiteX3" y="connsiteY3"/>
+              </a:cxn>
+              <a:cxn ang="0">
+                <a:pos x="connsiteX4" y="connsiteY4"/>
+              </a:cxn>
+            </a:cxnLst>
+            <a:rect l="l" t="t" r="r" b="b"/>
+            <a:pathLst>
+              <a:path w="1109472" h="1000768">
+                <a:moveTo>
+                  <a:pt x="0" y="950976"/>
+                </a:moveTo>
+                <a:cubicBezTo>
+                  <a:pt x="25400" y="966216"/>
+                  <a:pt x="50800" y="981456"/>
+                  <a:pt x="134112" y="987552"/>
+                </a:cubicBezTo>
+                <a:cubicBezTo>
+                  <a:pt x="217424" y="993648"/>
+                  <a:pt x="402336" y="1013968"/>
+                  <a:pt x="499872" y="987552"/>
+                </a:cubicBezTo>
+                <a:cubicBezTo>
+                  <a:pt x="597408" y="961136"/>
+                  <a:pt x="617728" y="993648"/>
+                  <a:pt x="719328" y="829056"/>
+                </a:cubicBezTo>
+                <a:cubicBezTo>
+                  <a:pt x="820928" y="664464"/>
+                  <a:pt x="965200" y="332232"/>
+                  <a:pt x="1109472" y="0"/>
                 </a:cubicBezTo>
               </a:path>
             </a:pathLst>

</xml_diff>